<commit_message>
Final Draft Rev. 3
</commit_message>
<xml_diff>
--- a/Documents/Thesis IMG.pptx
+++ b/Documents/Thesis IMG.pptx
@@ -109,6 +109,11 @@
       </a:defRPr>
     </a:lvl9pPr>
   </p:defaultTextStyle>
+  <p:extLst>
+    <p:ext uri="{EFAFB233-063F-42B5-8137-9DF3F51BA10A}">
+      <p15:sldGuideLst xmlns:p15="http://schemas.microsoft.com/office/powerpoint/2012/main"/>
+    </p:ext>
+  </p:extLst>
 </p:presentation>
 </file>
 
@@ -259,7 +264,7 @@
           <a:p>
             <a:fld id="{301E0647-8C9E-4D02-9694-EA09C96973B1}" type="datetimeFigureOut">
               <a:rPr lang="en-US" smtClean="0"/>
-              <a:t>5/16/2023</a:t>
+              <a:t>5/16/23</a:t>
             </a:fld>
             <a:endParaRPr lang="en-US"/>
           </a:p>
@@ -457,7 +462,7 @@
           <a:p>
             <a:fld id="{301E0647-8C9E-4D02-9694-EA09C96973B1}" type="datetimeFigureOut">
               <a:rPr lang="en-US" smtClean="0"/>
-              <a:t>5/16/2023</a:t>
+              <a:t>5/16/23</a:t>
             </a:fld>
             <a:endParaRPr lang="en-US"/>
           </a:p>
@@ -665,7 +670,7 @@
           <a:p>
             <a:fld id="{301E0647-8C9E-4D02-9694-EA09C96973B1}" type="datetimeFigureOut">
               <a:rPr lang="en-US" smtClean="0"/>
-              <a:t>5/16/2023</a:t>
+              <a:t>5/16/23</a:t>
             </a:fld>
             <a:endParaRPr lang="en-US"/>
           </a:p>
@@ -863,7 +868,7 @@
           <a:p>
             <a:fld id="{301E0647-8C9E-4D02-9694-EA09C96973B1}" type="datetimeFigureOut">
               <a:rPr lang="en-US" smtClean="0"/>
-              <a:t>5/16/2023</a:t>
+              <a:t>5/16/23</a:t>
             </a:fld>
             <a:endParaRPr lang="en-US"/>
           </a:p>
@@ -1138,7 +1143,7 @@
           <a:p>
             <a:fld id="{301E0647-8C9E-4D02-9694-EA09C96973B1}" type="datetimeFigureOut">
               <a:rPr lang="en-US" smtClean="0"/>
-              <a:t>5/16/2023</a:t>
+              <a:t>5/16/23</a:t>
             </a:fld>
             <a:endParaRPr lang="en-US"/>
           </a:p>
@@ -1403,7 +1408,7 @@
           <a:p>
             <a:fld id="{301E0647-8C9E-4D02-9694-EA09C96973B1}" type="datetimeFigureOut">
               <a:rPr lang="en-US" smtClean="0"/>
-              <a:t>5/16/2023</a:t>
+              <a:t>5/16/23</a:t>
             </a:fld>
             <a:endParaRPr lang="en-US"/>
           </a:p>
@@ -1815,7 +1820,7 @@
           <a:p>
             <a:fld id="{301E0647-8C9E-4D02-9694-EA09C96973B1}" type="datetimeFigureOut">
               <a:rPr lang="en-US" smtClean="0"/>
-              <a:t>5/16/2023</a:t>
+              <a:t>5/16/23</a:t>
             </a:fld>
             <a:endParaRPr lang="en-US"/>
           </a:p>
@@ -1956,7 +1961,7 @@
           <a:p>
             <a:fld id="{301E0647-8C9E-4D02-9694-EA09C96973B1}" type="datetimeFigureOut">
               <a:rPr lang="en-US" smtClean="0"/>
-              <a:t>5/16/2023</a:t>
+              <a:t>5/16/23</a:t>
             </a:fld>
             <a:endParaRPr lang="en-US"/>
           </a:p>
@@ -2069,7 +2074,7 @@
           <a:p>
             <a:fld id="{301E0647-8C9E-4D02-9694-EA09C96973B1}" type="datetimeFigureOut">
               <a:rPr lang="en-US" smtClean="0"/>
-              <a:t>5/16/2023</a:t>
+              <a:t>5/16/23</a:t>
             </a:fld>
             <a:endParaRPr lang="en-US"/>
           </a:p>
@@ -2380,7 +2385,7 @@
           <a:p>
             <a:fld id="{301E0647-8C9E-4D02-9694-EA09C96973B1}" type="datetimeFigureOut">
               <a:rPr lang="en-US" smtClean="0"/>
-              <a:t>5/16/2023</a:t>
+              <a:t>5/16/23</a:t>
             </a:fld>
             <a:endParaRPr lang="en-US"/>
           </a:p>
@@ -2668,7 +2673,7 @@
           <a:p>
             <a:fld id="{301E0647-8C9E-4D02-9694-EA09C96973B1}" type="datetimeFigureOut">
               <a:rPr lang="en-US" smtClean="0"/>
-              <a:t>5/16/2023</a:t>
+              <a:t>5/16/23</a:t>
             </a:fld>
             <a:endParaRPr lang="en-US"/>
           </a:p>
@@ -2909,7 +2914,7 @@
           <a:p>
             <a:fld id="{301E0647-8C9E-4D02-9694-EA09C96973B1}" type="datetimeFigureOut">
               <a:rPr lang="en-US" smtClean="0"/>
-              <a:t>5/16/2023</a:t>
+              <a:t>5/16/23</a:t>
             </a:fld>
             <a:endParaRPr lang="en-US"/>
           </a:p>
@@ -5899,6 +5904,7 @@
             </a:extLst>
           </p:cNvPr>
           <p:cNvCxnSpPr>
+            <a:cxnSpLocks/>
             <a:stCxn id="6" idx="2"/>
           </p:cNvCxnSpPr>
           <p:nvPr/>
@@ -5906,7 +5912,7 @@
         <p:spPr>
           <a:xfrm>
             <a:off x="4003588" y="2203622"/>
-            <a:ext cx="0" cy="1322173"/>
+            <a:ext cx="0" cy="1322172"/>
           </a:xfrm>
           <a:prstGeom prst="straightConnector1">
             <a:avLst/>
@@ -6248,12 +6254,20 @@
           <a:p>
             <a:pPr algn="ctr"/>
             <a:r>
+              <a:rPr lang="en-US">
+                <a:solidFill>
+                  <a:schemeClr val="tx1"/>
+                </a:solidFill>
+              </a:rPr>
+              <a:t>Pitch (F0) </a:t>
+            </a:r>
+            <a:r>
               <a:rPr lang="en-US" dirty="0">
                 <a:solidFill>
                   <a:schemeClr val="tx1"/>
                 </a:solidFill>
               </a:rPr>
-              <a:t>Pitch Detection &amp; Spectral Analysis – PYSPTK &amp; Sonic Visualizer</a:t>
+              <a:t>Estimation – PYSPTK</a:t>
             </a:r>
           </a:p>
         </p:txBody>
@@ -6678,6 +6692,105 @@
               <a:rPr lang="en-US" dirty="0"/>
               <a:t>Python &amp; Sonic Visualizer Data Flow</a:t>
             </a:r>
+          </a:p>
+        </p:txBody>
+      </p:sp>
+      <p:sp>
+        <p:nvSpPr>
+          <p:cNvPr id="3" name="Rectangle 2">
+            <a:extLst>
+              <a:ext uri="{FF2B5EF4-FFF2-40B4-BE49-F238E27FC236}">
+                <a16:creationId xmlns:a16="http://schemas.microsoft.com/office/drawing/2014/main" id="{3996D9F9-3F2F-7572-7BA1-7246BB66E802}"/>
+              </a:ext>
+            </a:extLst>
+          </p:cNvPr>
+          <p:cNvSpPr/>
+          <p:nvPr/>
+        </p:nvSpPr>
+        <p:spPr>
+          <a:xfrm>
+            <a:off x="4281063" y="2409568"/>
+            <a:ext cx="1878662" cy="716692"/>
+          </a:xfrm>
+          <a:prstGeom prst="rect">
+            <a:avLst/>
+          </a:prstGeom>
+          <a:ln/>
+        </p:spPr>
+        <p:style>
+          <a:lnRef idx="2">
+            <a:schemeClr val="accent1"/>
+          </a:lnRef>
+          <a:fillRef idx="1">
+            <a:schemeClr val="lt1"/>
+          </a:fillRef>
+          <a:effectRef idx="0">
+            <a:schemeClr val="accent1"/>
+          </a:effectRef>
+          <a:fontRef idx="minor">
+            <a:schemeClr val="dk1"/>
+          </a:fontRef>
+        </p:style>
+        <p:txBody>
+          <a:bodyPr rtlCol="0" anchor="ctr"/>
+          <a:lstStyle/>
+          <a:p>
+            <a:pPr algn="ctr"/>
+            <a:r>
+              <a:rPr lang="en-US" dirty="0">
+                <a:solidFill>
+                  <a:schemeClr val="accent1">
+                    <a:lumMod val="75000"/>
+                  </a:schemeClr>
+                </a:solidFill>
+              </a:rPr>
+              <a:t>Spectral Analysis (Sonic Visualizer)</a:t>
+            </a:r>
+          </a:p>
+        </p:txBody>
+      </p:sp>
+      <p:sp>
+        <p:nvSpPr>
+          <p:cNvPr id="11" name="Right Brace 10">
+            <a:extLst>
+              <a:ext uri="{FF2B5EF4-FFF2-40B4-BE49-F238E27FC236}">
+                <a16:creationId xmlns:a16="http://schemas.microsoft.com/office/drawing/2014/main" id="{B7DDDF45-D646-07E7-0DA7-4EF75211FDE6}"/>
+              </a:ext>
+            </a:extLst>
+          </p:cNvPr>
+          <p:cNvSpPr/>
+          <p:nvPr/>
+        </p:nvSpPr>
+        <p:spPr>
+          <a:xfrm rot="5400000">
+            <a:off x="5128047" y="1441629"/>
+            <a:ext cx="181233" cy="1754648"/>
+          </a:xfrm>
+          <a:prstGeom prst="rightBrace">
+            <a:avLst/>
+          </a:prstGeom>
+          <a:ln/>
+        </p:spPr>
+        <p:style>
+          <a:lnRef idx="2">
+            <a:schemeClr val="accent1"/>
+          </a:lnRef>
+          <a:fillRef idx="1">
+            <a:schemeClr val="lt1"/>
+          </a:fillRef>
+          <a:effectRef idx="0">
+            <a:schemeClr val="accent1"/>
+          </a:effectRef>
+          <a:fontRef idx="minor">
+            <a:schemeClr val="dk1"/>
+          </a:fontRef>
+        </p:style>
+        <p:txBody>
+          <a:bodyPr rtlCol="0" anchor="ctr"/>
+          <a:lstStyle/>
+          <a:p>
+            <a:pPr algn="ctr"/>
+            <a:endParaRPr lang="en-US"/>
           </a:p>
         </p:txBody>
       </p:sp>

</xml_diff>